<commit_message>
ch9 slides and update
</commit_message>
<xml_diff>
--- a/presentation.pptx
+++ b/presentation.pptx
@@ -315,7 +315,7 @@
           <a:p>
             <a:fld id="{D987070D-87AF-4443-8990-425EA27CC244}" type="datetimeFigureOut">
               <a:rPr lang="de-CH" smtClean="0"/>
-              <a:t>18.06.2017</a:t>
+              <a:t>26.06.2017</a:t>
             </a:fld>
             <a:endParaRPr lang="de-CH"/>
           </a:p>
@@ -6796,6 +6796,10 @@
           <a:bodyPr/>
           <a:lstStyle/>
           <a:p>
+            <a:r>
+              <a:rPr lang="en-US" dirty="0"/>
+              <a:t>This is what Karl showed to his team</a:t>
+            </a:r>
             <a:endParaRPr lang="de-CH" dirty="0"/>
           </a:p>
         </p:txBody>
@@ -6879,15 +6883,6 @@
         <p:txBody>
           <a:bodyPr/>
           <a:lstStyle/>
-          <a:p>
-            <a:r>
-              <a:rPr lang="en-US" dirty="0"/>
-              <a:t>This is what Karl showed to his team</a:t>
-            </a:r>
-          </a:p>
-          <a:p>
-            <a:endParaRPr lang="en-US" dirty="0"/>
-          </a:p>
           <a:p>
             <a:r>
               <a:rPr lang="en-US" dirty="0"/>
@@ -7064,7 +7059,7 @@
           <a:p>
             <a:fld id="{A2EAEABE-1D59-4413-813E-803E21872067}" type="datetimeFigureOut">
               <a:rPr lang="de-CH" smtClean="0"/>
-              <a:t>18.06.2017</a:t>
+              <a:t>26.06.2017</a:t>
             </a:fld>
             <a:endParaRPr lang="de-CH"/>
           </a:p>
@@ -7234,7 +7229,7 @@
           <a:p>
             <a:fld id="{A2EAEABE-1D59-4413-813E-803E21872067}" type="datetimeFigureOut">
               <a:rPr lang="de-CH" smtClean="0"/>
-              <a:t>18.06.2017</a:t>
+              <a:t>26.06.2017</a:t>
             </a:fld>
             <a:endParaRPr lang="de-CH"/>
           </a:p>
@@ -7414,7 +7409,7 @@
           <a:p>
             <a:fld id="{A2EAEABE-1D59-4413-813E-803E21872067}" type="datetimeFigureOut">
               <a:rPr lang="de-CH" smtClean="0"/>
-              <a:t>18.06.2017</a:t>
+              <a:t>26.06.2017</a:t>
             </a:fld>
             <a:endParaRPr lang="de-CH"/>
           </a:p>
@@ -7583,7 +7578,7 @@
           <a:p>
             <a:fld id="{A2EAEABE-1D59-4413-813E-803E21872067}" type="datetimeFigureOut">
               <a:rPr lang="de-CH" smtClean="0"/>
-              <a:t>18.06.2017</a:t>
+              <a:t>26.06.2017</a:t>
             </a:fld>
             <a:endParaRPr lang="de-CH"/>
           </a:p>
@@ -7829,7 +7824,7 @@
           <a:p>
             <a:fld id="{A2EAEABE-1D59-4413-813E-803E21872067}" type="datetimeFigureOut">
               <a:rPr lang="de-CH" smtClean="0"/>
-              <a:t>18.06.2017</a:t>
+              <a:t>26.06.2017</a:t>
             </a:fld>
             <a:endParaRPr lang="de-CH"/>
           </a:p>
@@ -8061,7 +8056,7 @@
           <a:p>
             <a:fld id="{A2EAEABE-1D59-4413-813E-803E21872067}" type="datetimeFigureOut">
               <a:rPr lang="de-CH" smtClean="0"/>
-              <a:t>18.06.2017</a:t>
+              <a:t>26.06.2017</a:t>
             </a:fld>
             <a:endParaRPr lang="de-CH"/>
           </a:p>
@@ -8428,7 +8423,7 @@
           <a:p>
             <a:fld id="{A2EAEABE-1D59-4413-813E-803E21872067}" type="datetimeFigureOut">
               <a:rPr lang="de-CH" smtClean="0"/>
-              <a:t>18.06.2017</a:t>
+              <a:t>26.06.2017</a:t>
             </a:fld>
             <a:endParaRPr lang="de-CH"/>
           </a:p>
@@ -8546,7 +8541,7 @@
           <a:p>
             <a:fld id="{A2EAEABE-1D59-4413-813E-803E21872067}" type="datetimeFigureOut">
               <a:rPr lang="de-CH" smtClean="0"/>
-              <a:t>18.06.2017</a:t>
+              <a:t>26.06.2017</a:t>
             </a:fld>
             <a:endParaRPr lang="de-CH"/>
           </a:p>
@@ -8641,7 +8636,7 @@
           <a:p>
             <a:fld id="{A2EAEABE-1D59-4413-813E-803E21872067}" type="datetimeFigureOut">
               <a:rPr lang="de-CH" smtClean="0"/>
-              <a:t>18.06.2017</a:t>
+              <a:t>26.06.2017</a:t>
             </a:fld>
             <a:endParaRPr lang="de-CH"/>
           </a:p>
@@ -8918,7 +8913,7 @@
           <a:p>
             <a:fld id="{A2EAEABE-1D59-4413-813E-803E21872067}" type="datetimeFigureOut">
               <a:rPr lang="de-CH" smtClean="0"/>
-              <a:t>18.06.2017</a:t>
+              <a:t>26.06.2017</a:t>
             </a:fld>
             <a:endParaRPr lang="de-CH"/>
           </a:p>
@@ -9175,7 +9170,7 @@
           <a:p>
             <a:fld id="{A2EAEABE-1D59-4413-813E-803E21872067}" type="datetimeFigureOut">
               <a:rPr lang="de-CH" smtClean="0"/>
-              <a:t>18.06.2017</a:t>
+              <a:t>26.06.2017</a:t>
             </a:fld>
             <a:endParaRPr lang="de-CH"/>
           </a:p>
@@ -9386,7 +9381,7 @@
           <a:p>
             <a:fld id="{A2EAEABE-1D59-4413-813E-803E21872067}" type="datetimeFigureOut">
               <a:rPr lang="de-CH" smtClean="0"/>
-              <a:t>18.06.2017</a:t>
+              <a:t>26.06.2017</a:t>
             </a:fld>
             <a:endParaRPr lang="de-CH"/>
           </a:p>

</xml_diff>